<commit_message>
Minor updates to several prsentations
Also slight change to talk-order
</commit_message>
<xml_diff>
--- a/Pres/OOBrushUp.pptx
+++ b/Pres/OOBrushUp.pptx
@@ -3977,7 +3977,18 @@
               <a:rPr lang="da-DK" b="1" smtClean="0">
                 <a:latin typeface="Consolas" panose="020B0609020204030204" pitchFamily="49" charset="0"/>
               </a:rPr>
-              <a:t> Car</a:t>
+              <a:t> </a:t>
+            </a:r>
+            <a:r>
+              <a:rPr lang="da-DK" b="1" smtClean="0">
+                <a:solidFill>
+                  <a:schemeClr val="accent6">
+                    <a:lumMod val="75000"/>
+                  </a:schemeClr>
+                </a:solidFill>
+                <a:latin typeface="Consolas" panose="020B0609020204030204" pitchFamily="49" charset="0"/>
+              </a:rPr>
+              <a:t>Car</a:t>
             </a:r>
           </a:p>
           <a:p>
@@ -22875,7 +22886,18 @@
               <a:rPr lang="da-DK" sz="4800" b="1" smtClean="0">
                 <a:latin typeface="Consolas" panose="020B0609020204030204" pitchFamily="49" charset="0"/>
               </a:rPr>
-              <a:t> Car</a:t>
+              <a:t> </a:t>
+            </a:r>
+            <a:r>
+              <a:rPr lang="da-DK" sz="4800" b="1" smtClean="0">
+                <a:solidFill>
+                  <a:schemeClr val="accent6">
+                    <a:lumMod val="75000"/>
+                  </a:schemeClr>
+                </a:solidFill>
+                <a:latin typeface="Consolas" panose="020B0609020204030204" pitchFamily="49" charset="0"/>
+              </a:rPr>
+              <a:t>Car</a:t>
             </a:r>
           </a:p>
           <a:p>
@@ -23390,8 +23412,8 @@
         </p:nvSpPr>
         <p:spPr>
           <a:xfrm>
-            <a:off x="1443789" y="2506662"/>
-            <a:ext cx="9499484" cy="1622426"/>
+            <a:off x="1443788" y="2506662"/>
+            <a:ext cx="9685765" cy="1622426"/>
           </a:xfrm>
         </p:spPr>
         <p:txBody>
@@ -28153,7 +28175,18 @@
               <a:rPr lang="da-DK" sz="2800" b="1" smtClean="0">
                 <a:latin typeface="Consolas" panose="020B0609020204030204" pitchFamily="49" charset="0"/>
               </a:rPr>
-              <a:t> Car</a:t>
+              <a:t> </a:t>
+            </a:r>
+            <a:r>
+              <a:rPr lang="da-DK" sz="2800" b="1" smtClean="0">
+                <a:solidFill>
+                  <a:schemeClr val="accent6">
+                    <a:lumMod val="75000"/>
+                  </a:schemeClr>
+                </a:solidFill>
+                <a:latin typeface="Consolas" panose="020B0609020204030204" pitchFamily="49" charset="0"/>
+              </a:rPr>
+              <a:t>Car</a:t>
             </a:r>
           </a:p>
           <a:p>

</xml_diff>